<commit_message>
Link to github repository added
</commit_message>
<xml_diff>
--- a/docs/Slaidi.2022.07.04.pptx
+++ b/docs/Slaidi.2022.07.04.pptx
@@ -111,6 +111,11 @@
       </a:defRPr>
     </a:lvl9pPr>
   </p:defaultTextStyle>
+  <p:extLst>
+    <p:ext uri="{EFAFB233-063F-42B5-8137-9DF3F51BA10A}">
+      <p15:sldGuideLst xmlns:p15="http://schemas.microsoft.com/office/powerpoint/2012/main"/>
+    </p:ext>
+  </p:extLst>
 </p:presentation>
 </file>
 
@@ -3381,7 +3386,9 @@
         </p:nvSpPr>
         <p:spPr/>
         <p:txBody>
-          <a:bodyPr/>
+          <a:bodyPr>
+            <a:normAutofit fontScale="77500" lnSpcReduction="20000"/>
+          </a:bodyPr>
           <a:lstStyle/>
           <a:p>
             <a:r>
@@ -3417,6 +3424,21 @@
                 <a:latin typeface="Roboto" panose="02000000000000000000" pitchFamily="2" charset="0"/>
               </a:rPr>
               <a:t>2022.gada 4.jūlijs</a:t>
+            </a:r>
+          </a:p>
+          <a:p>
+            <a:endParaRPr lang="lv-LV" b="1" i="0" dirty="0">
+              <a:effectLst/>
+              <a:latin typeface="Roboto" panose="02000000000000000000" pitchFamily="2" charset="0"/>
+            </a:endParaRPr>
+          </a:p>
+          <a:p>
+            <a:r>
+              <a:rPr lang="en-US" b="1" i="0">
+                <a:effectLst/>
+                <a:latin typeface="Roboto" panose="02000000000000000000" pitchFamily="2" charset="0"/>
+              </a:rPr>
+              <a:t>https://github.com/DitaGabalina/devops_db_group</a:t>
             </a:r>
             <a:endParaRPr lang="en-US" b="1" i="0" dirty="0">
               <a:effectLst/>

</xml_diff>

<commit_message>
Cassandra in Docker container experiment added
</commit_message>
<xml_diff>
--- a/docs/Slaidi.2022.07.04.pptx
+++ b/docs/Slaidi.2022.07.04.pptx
@@ -12,7 +12,8 @@
     <p:sldId id="260" r:id="rId6"/>
     <p:sldId id="261" r:id="rId7"/>
     <p:sldId id="262" r:id="rId8"/>
-    <p:sldId id="263" r:id="rId9"/>
+    <p:sldId id="264" r:id="rId9"/>
+    <p:sldId id="263" r:id="rId10"/>
   </p:sldIdLst>
   <p:sldSz cx="12192000" cy="6858000"/>
   <p:notesSz cx="6858000" cy="9144000"/>
@@ -4966,6 +4967,137 @@
       </p:grpSpPr>
       <p:sp>
         <p:nvSpPr>
+          <p:cNvPr id="2" name="Title 1">
+            <a:extLst>
+              <a:ext uri="{FF2B5EF4-FFF2-40B4-BE49-F238E27FC236}">
+                <a16:creationId xmlns:a16="http://schemas.microsoft.com/office/drawing/2014/main" id="{3BE0939A-5FCD-5CCB-E695-C85D79C283DB}"/>
+              </a:ext>
+            </a:extLst>
+          </p:cNvPr>
+          <p:cNvSpPr>
+            <a:spLocks noGrp="1"/>
+          </p:cNvSpPr>
+          <p:nvPr>
+            <p:ph type="title"/>
+          </p:nvPr>
+        </p:nvSpPr>
+        <p:spPr/>
+        <p:txBody>
+          <a:bodyPr>
+            <a:normAutofit fontScale="90000"/>
+          </a:bodyPr>
+          <a:lstStyle/>
+          <a:p>
+            <a:r>
+              <a:rPr lang="lv-LV" dirty="0"/>
+              <a:t>Projektā izmantotās labās prakses un secinājumi </a:t>
+            </a:r>
+            <a:br>
+              <a:rPr lang="lv-LV" dirty="0"/>
+            </a:br>
+            <a:r>
+              <a:rPr lang="lv-LV" dirty="0"/>
+              <a:t>Konteineru izmantošana</a:t>
+            </a:r>
+            <a:endParaRPr lang="en-US" dirty="0"/>
+          </a:p>
+        </p:txBody>
+      </p:sp>
+      <p:sp>
+        <p:nvSpPr>
+          <p:cNvPr id="3" name="Content Placeholder 2">
+            <a:extLst>
+              <a:ext uri="{FF2B5EF4-FFF2-40B4-BE49-F238E27FC236}">
+                <a16:creationId xmlns:a16="http://schemas.microsoft.com/office/drawing/2014/main" id="{E200A2F7-933F-0CFB-CBF6-50FDC9FDC079}"/>
+              </a:ext>
+            </a:extLst>
+          </p:cNvPr>
+          <p:cNvSpPr>
+            <a:spLocks noGrp="1"/>
+          </p:cNvSpPr>
+          <p:nvPr>
+            <p:ph idx="1"/>
+          </p:nvPr>
+        </p:nvSpPr>
+        <p:spPr/>
+        <p:txBody>
+          <a:bodyPr/>
+          <a:lstStyle/>
+          <a:p>
+            <a:r>
+              <a:rPr lang="lv-LV" dirty="0"/>
+              <a:t>Tika pamēģināts Cassandra darbināt konteinerī (</a:t>
+            </a:r>
+            <a:r>
+              <a:rPr lang="lv-LV" dirty="0" err="1"/>
+              <a:t>Docker</a:t>
+            </a:r>
+            <a:r>
+              <a:rPr lang="lv-LV" dirty="0"/>
+              <a:t>)</a:t>
+            </a:r>
+          </a:p>
+          <a:p>
+            <a:pPr lvl="1"/>
+            <a:r>
+              <a:rPr lang="lv-LV" dirty="0"/>
+              <a:t>Šādam scenārijam bija nepieciešama </a:t>
+            </a:r>
+            <a:r>
+              <a:rPr lang="lv-LV" dirty="0" err="1"/>
+              <a:t>aws</a:t>
+            </a:r>
+            <a:r>
+              <a:rPr lang="lv-LV" dirty="0"/>
+              <a:t> t3.large konfigurācija, kas palielinātu izmaksas</a:t>
+            </a:r>
+          </a:p>
+          <a:p>
+            <a:pPr lvl="1"/>
+            <a:r>
+              <a:rPr lang="lv-LV" dirty="0"/>
+              <a:t>Bez konteinera praktiskā darba scenārijiem pietika ar t3.</a:t>
+            </a:r>
+            <a:r>
+              <a:rPr lang="lv-LV"/>
+              <a:t>small konfigurāciju</a:t>
+            </a:r>
+            <a:endParaRPr lang="en-US" dirty="0"/>
+          </a:p>
+        </p:txBody>
+      </p:sp>
+    </p:spTree>
+    <p:extLst>
+      <p:ext uri="{BB962C8B-B14F-4D97-AF65-F5344CB8AC3E}">
+        <p14:creationId xmlns:p14="http://schemas.microsoft.com/office/powerpoint/2010/main" val="1362442816"/>
+      </p:ext>
+    </p:extLst>
+  </p:cSld>
+  <p:clrMapOvr>
+    <a:masterClrMapping/>
+  </p:clrMapOvr>
+</p:sld>
+</file>
+
+<file path=ppt/slides/slide9.xml><?xml version="1.0" encoding="utf-8"?>
+<p:sld xmlns:a="http://schemas.openxmlformats.org/drawingml/2006/main" xmlns:r="http://schemas.openxmlformats.org/officeDocument/2006/relationships" xmlns:p="http://schemas.openxmlformats.org/presentationml/2006/main">
+  <p:cSld>
+    <p:spTree>
+      <p:nvGrpSpPr>
+        <p:cNvPr id="1" name=""/>
+        <p:cNvGrpSpPr/>
+        <p:nvPr/>
+      </p:nvGrpSpPr>
+      <p:grpSpPr>
+        <a:xfrm>
+          <a:off x="0" y="0"/>
+          <a:ext cx="0" cy="0"/>
+          <a:chOff x="0" y="0"/>
+          <a:chExt cx="0" cy="0"/>
+        </a:xfrm>
+      </p:grpSpPr>
+      <p:sp>
+        <p:nvSpPr>
           <p:cNvPr id="4" name="Title 3">
             <a:extLst>
               <a:ext uri="{FF2B5EF4-FFF2-40B4-BE49-F238E27FC236}">

</xml_diff>